<commit_message>
Aggiunta icone (da sistemare)
</commit_message>
<xml_diff>
--- a/Parte 2/Presentazione TedxTok(parte 2).pptx
+++ b/Parte 2/Presentazione TedxTok(parte 2).pptx
@@ -271,7 +271,7 @@
       <p15:sldGuideLst xmlns:p15="http://schemas.microsoft.com/office/powerpoint/2012/main"/>
     </p:ext>
     <p:ext uri="GoogleSlidesCustomDataVersion2">
-      <go:slidesCustomData xmlns="" xmlns:mc="http://schemas.openxmlformats.org/markup-compatibility/2006" xmlns:mv="urn:schemas-microsoft-com:mac:vml" xmlns:c="http://schemas.openxmlformats.org/drawingml/2006/chart" xmlns:dgm="http://schemas.openxmlformats.org/drawingml/2006/diagram" xmlns:o="urn:schemas-microsoft-com:office:office" xmlns:v="urn:schemas-microsoft-com:vml" xmlns:pvml="urn:schemas-microsoft-com:office:powerpoint" xmlns:com="http://schemas.openxmlformats.org/drawingml/2006/compatibility" xmlns:p14="http://schemas.microsoft.com/office/powerpoint/2010/main" xmlns:p15="http://schemas.microsoft.com/office/powerpoint/2012/main" xmlns:ahyp="http://schemas.microsoft.com/office/drawing/2018/hyperlinkcolor" xmlns:go="http://customooxmlschemas.google.com/" r:id="rId22" roundtripDataSignature="AMtx7mhz1SmdKV2hiuRVC0M0Qv/I3R/bJw=="/>
+      <go:slidesCustomData xmlns:go="http://customooxmlschemas.google.com/" xmlns:ahyp="http://schemas.microsoft.com/office/drawing/2018/hyperlinkcolor" xmlns:p15="http://schemas.microsoft.com/office/powerpoint/2012/main" xmlns:p14="http://schemas.microsoft.com/office/powerpoint/2010/main" xmlns:com="http://schemas.openxmlformats.org/drawingml/2006/compatibility" xmlns:pvml="urn:schemas-microsoft-com:office:powerpoint" xmlns:v="urn:schemas-microsoft-com:vml" xmlns:o="urn:schemas-microsoft-com:office:office" xmlns:dgm="http://schemas.openxmlformats.org/drawingml/2006/diagram" xmlns:c="http://schemas.openxmlformats.org/drawingml/2006/chart" xmlns:mv="urn:schemas-microsoft-com:mac:vml" xmlns:mc="http://schemas.openxmlformats.org/markup-compatibility/2006" xmlns="" r:id="rId22" roundtripDataSignature="AMtx7mhz1SmdKV2hiuRVC0M0Qv/I3R/bJw=="/>
     </p:ext>
   </p:extLst>
 </p:presentation>
@@ -17065,6 +17065,65 @@
           </a:p>
         </p:txBody>
       </p:sp>
+      <p:pic>
+        <p:nvPicPr>
+          <p:cNvPr id="4" name="Immagine 3" descr="Immagine che contiene logo, Elementi grafici, simbolo, design">
+            <a:extLst>
+              <a:ext uri="{FF2B5EF4-FFF2-40B4-BE49-F238E27FC236}">
+                <a16:creationId xmlns:a16="http://schemas.microsoft.com/office/drawing/2014/main" id="{AAB9C26E-F8DE-9085-7BE4-B0107646BCEF}"/>
+              </a:ext>
+            </a:extLst>
+          </p:cNvPr>
+          <p:cNvPicPr>
+            <a:picLocks noChangeAspect="1"/>
+          </p:cNvPicPr>
+          <p:nvPr/>
+        </p:nvPicPr>
+        <p:blipFill>
+          <a:blip r:embed="rId3"/>
+          <a:stretch>
+            <a:fillRect/>
+          </a:stretch>
+        </p:blipFill>
+        <p:spPr>
+          <a:xfrm>
+            <a:off x="7357137" y="4399639"/>
+            <a:ext cx="2269463" cy="1845411"/>
+          </a:xfrm>
+          <a:prstGeom prst="rect">
+            <a:avLst/>
+          </a:prstGeom>
+        </p:spPr>
+      </p:pic>
+      <p:pic>
+        <p:nvPicPr>
+          <p:cNvPr id="6" name="Immagine 5" descr="Immagine che contiene schermata, design&#10;&#10;Descrizione generata automaticamente">
+            <a:extLst>
+              <a:ext uri="{FF2B5EF4-FFF2-40B4-BE49-F238E27FC236}">
+                <a16:creationId xmlns:a16="http://schemas.microsoft.com/office/drawing/2014/main" id="{AC872381-CE9F-44F9-79F3-B8D39FC6E612}"/>
+              </a:ext>
+            </a:extLst>
+          </p:cNvPr>
+          <p:cNvPicPr>
+            <a:picLocks noChangeAspect="1"/>
+          </p:cNvPicPr>
+          <p:nvPr/>
+        </p:nvPicPr>
+        <p:blipFill rotWithShape="1">
+          <a:blip r:embed="rId4"/>
+          <a:srcRect t="22692" b="38559"/>
+          <a:stretch/>
+        </p:blipFill>
+        <p:spPr>
+          <a:xfrm>
+            <a:off x="1730000" y="4399639"/>
+            <a:ext cx="4762500" cy="1845411"/>
+          </a:xfrm>
+          <a:prstGeom prst="rect">
+            <a:avLst/>
+          </a:prstGeom>
+        </p:spPr>
+      </p:pic>
     </p:spTree>
   </p:cSld>
   <p:clrMapOvr>

</xml_diff>

<commit_message>
inizio presentazione parte 3
</commit_message>
<xml_diff>
--- a/Parte 2/Presentazione TedxTok(parte 2).pptx
+++ b/Parte 2/Presentazione TedxTok(parte 2).pptx
@@ -271,7 +271,7 @@
       <p15:sldGuideLst xmlns:p15="http://schemas.microsoft.com/office/powerpoint/2012/main"/>
     </p:ext>
     <p:ext uri="GoogleSlidesCustomDataVersion2">
-      <go:slidesCustomData xmlns:go="http://customooxmlschemas.google.com/" xmlns:ahyp="http://schemas.microsoft.com/office/drawing/2018/hyperlinkcolor" xmlns:p15="http://schemas.microsoft.com/office/powerpoint/2012/main" xmlns:p14="http://schemas.microsoft.com/office/powerpoint/2010/main" xmlns:com="http://schemas.openxmlformats.org/drawingml/2006/compatibility" xmlns:pvml="urn:schemas-microsoft-com:office:powerpoint" xmlns:v="urn:schemas-microsoft-com:vml" xmlns:o="urn:schemas-microsoft-com:office:office" xmlns:dgm="http://schemas.openxmlformats.org/drawingml/2006/diagram" xmlns:c="http://schemas.openxmlformats.org/drawingml/2006/chart" xmlns:mv="urn:schemas-microsoft-com:mac:vml" xmlns:mc="http://schemas.openxmlformats.org/markup-compatibility/2006" xmlns="" r:id="rId22" roundtripDataSignature="AMtx7mhz1SmdKV2hiuRVC0M0Qv/I3R/bJw=="/>
+      <go:slidesCustomData xmlns="" xmlns:mc="http://schemas.openxmlformats.org/markup-compatibility/2006" xmlns:mv="urn:schemas-microsoft-com:mac:vml" xmlns:c="http://schemas.openxmlformats.org/drawingml/2006/chart" xmlns:dgm="http://schemas.openxmlformats.org/drawingml/2006/diagram" xmlns:o="urn:schemas-microsoft-com:office:office" xmlns:v="urn:schemas-microsoft-com:vml" xmlns:pvml="urn:schemas-microsoft-com:office:powerpoint" xmlns:com="http://schemas.openxmlformats.org/drawingml/2006/compatibility" xmlns:p14="http://schemas.microsoft.com/office/powerpoint/2010/main" xmlns:p15="http://schemas.microsoft.com/office/powerpoint/2012/main" xmlns:ahyp="http://schemas.microsoft.com/office/drawing/2018/hyperlinkcolor" xmlns:go="http://customooxmlschemas.google.com/" r:id="rId22" roundtripDataSignature="AMtx7mhz1SmdKV2hiuRVC0M0Qv/I3R/bJw=="/>
     </p:ext>
   </p:extLst>
 </p:presentation>
@@ -16884,7 +16884,7 @@
         </p:nvSpPr>
         <p:spPr>
           <a:xfrm>
-            <a:off x="1730000" y="691825"/>
+            <a:off x="1730000" y="599503"/>
             <a:ext cx="4708500" cy="1051800"/>
           </a:xfrm>
           <a:prstGeom prst="rect">
@@ -16915,14 +16915,14 @@
               <a:buNone/>
             </a:pPr>
             <a:r>
-              <a:rPr lang="it-IT"/>
+              <a:rPr lang="it-IT" dirty="0"/>
               <a:t>CRITICIT</a:t>
             </a:r>
             <a:r>
-              <a:rPr lang="it-IT" cap="none"/>
+              <a:rPr lang="it-IT" cap="none" dirty="0"/>
               <a:t>À</a:t>
             </a:r>
-            <a:endParaRPr cap="none"/>
+            <a:endParaRPr cap="none" dirty="0"/>
           </a:p>
         </p:txBody>
       </p:sp>
@@ -16938,7 +16938,7 @@
         </p:nvSpPr>
         <p:spPr>
           <a:xfrm>
-            <a:off x="6113150" y="365125"/>
+            <a:off x="6113149" y="354660"/>
             <a:ext cx="5240700" cy="1325700"/>
           </a:xfrm>
           <a:prstGeom prst="rect">

</xml_diff>